<commit_message>
Initial commit of study blueprint
</commit_message>
<xml_diff>
--- a/warner-AZ300.pptx
+++ b/warner-AZ300.pptx
@@ -13,18 +13,19 @@
     <p:sldId id="266" r:id="rId7"/>
     <p:sldId id="259" r:id="rId8"/>
     <p:sldId id="272" r:id="rId9"/>
-    <p:sldId id="265" r:id="rId10"/>
-    <p:sldId id="267" r:id="rId11"/>
-    <p:sldId id="273" r:id="rId12"/>
-    <p:sldId id="264" r:id="rId13"/>
-    <p:sldId id="268" r:id="rId14"/>
-    <p:sldId id="263" r:id="rId15"/>
-    <p:sldId id="269" r:id="rId16"/>
-    <p:sldId id="261" r:id="rId17"/>
-    <p:sldId id="270" r:id="rId18"/>
-    <p:sldId id="262" r:id="rId19"/>
-    <p:sldId id="271" r:id="rId20"/>
-    <p:sldId id="303" r:id="rId21"/>
+    <p:sldId id="304" r:id="rId10"/>
+    <p:sldId id="265" r:id="rId11"/>
+    <p:sldId id="267" r:id="rId12"/>
+    <p:sldId id="273" r:id="rId13"/>
+    <p:sldId id="264" r:id="rId14"/>
+    <p:sldId id="268" r:id="rId15"/>
+    <p:sldId id="263" r:id="rId16"/>
+    <p:sldId id="269" r:id="rId17"/>
+    <p:sldId id="261" r:id="rId18"/>
+    <p:sldId id="270" r:id="rId19"/>
+    <p:sldId id="262" r:id="rId20"/>
+    <p:sldId id="271" r:id="rId21"/>
+    <p:sldId id="303" r:id="rId22"/>
   </p:sldIdLst>
   <p:sldSz cx="9144000" cy="5143500" type="screen16x9"/>
   <p:notesSz cx="6858000" cy="9144000"/>
@@ -2175,10 +2176,10 @@
       </p:grpSpPr>
       <p:sp>
         <p:nvSpPr>
-          <p:cNvPr id="2" name="Title 1">
+          <p:cNvPr id="6" name="Title 5">
             <a:extLst>
               <a:ext uri="{FF2B5EF4-FFF2-40B4-BE49-F238E27FC236}">
-                <a16:creationId xmlns:a16="http://schemas.microsoft.com/office/drawing/2014/main" id="{25C6E663-D0AD-564E-AFD0-A2EAFE729E79}"/>
+                <a16:creationId xmlns:a16="http://schemas.microsoft.com/office/drawing/2014/main" id="{D9FFC0E8-97CE-4426-A0C0-75252002ED16}"/>
               </a:ext>
             </a:extLst>
           </p:cNvPr>
@@ -2186,7 +2187,7 @@
             <a:spLocks noGrp="1"/>
           </p:cNvSpPr>
           <p:nvPr>
-            <p:ph type="title"/>
+            <p:ph type="ctrTitle"/>
           </p:nvPr>
         </p:nvSpPr>
         <p:spPr/>
@@ -2196,55 +2197,19 @@
           <a:p>
             <a:r>
               <a:rPr lang="en-US" dirty="0"/>
-              <a:t>Module 2 Learning Objectives</a:t>
-            </a:r>
-          </a:p>
-        </p:txBody>
-      </p:sp>
-      <p:sp>
-        <p:nvSpPr>
-          <p:cNvPr id="3" name="Content Placeholder 2">
-            <a:extLst>
-              <a:ext uri="{FF2B5EF4-FFF2-40B4-BE49-F238E27FC236}">
-                <a16:creationId xmlns:a16="http://schemas.microsoft.com/office/drawing/2014/main" id="{CC25EB59-169C-FE49-B976-0294784B9F8E}"/>
-              </a:ext>
-            </a:extLst>
-          </p:cNvPr>
-          <p:cNvSpPr>
-            <a:spLocks noGrp="1"/>
-          </p:cNvSpPr>
-          <p:nvPr>
-            <p:ph idx="1"/>
-          </p:nvPr>
-        </p:nvSpPr>
-        <p:spPr/>
-        <p:txBody>
-          <a:bodyPr/>
-          <a:lstStyle/>
-          <a:p>
-            <a:r>
-              <a:rPr lang="en-US" dirty="0"/>
-              <a:t>Migrate servers to Azure</a:t>
-            </a:r>
-          </a:p>
-          <a:p>
-            <a:r>
-              <a:rPr lang="en-US" dirty="0"/>
-              <a:t>Configure serverless computing</a:t>
-            </a:r>
-          </a:p>
-          <a:p>
-            <a:r>
-              <a:rPr lang="en-US" dirty="0"/>
-              <a:t>Implement application load balancing</a:t>
-            </a:r>
+              <a:t>Module 2 Implement Azure Workloads and Security</a:t>
+            </a:r>
+            <a:br>
+              <a:rPr lang="en-US" dirty="0"/>
+            </a:br>
+            <a:endParaRPr lang="en-US" dirty="0"/>
           </a:p>
         </p:txBody>
       </p:sp>
     </p:spTree>
     <p:extLst>
       <p:ext uri="{BB962C8B-B14F-4D97-AF65-F5344CB8AC3E}">
-        <p14:creationId xmlns:p14="http://schemas.microsoft.com/office/powerpoint/2010/main" val="2206647766"/>
+        <p14:creationId xmlns:p14="http://schemas.microsoft.com/office/powerpoint/2010/main" val="3068621773"/>
       </p:ext>
     </p:extLst>
   </p:cSld>
@@ -2294,7 +2259,7 @@
           <a:p>
             <a:r>
               <a:rPr lang="en-US" dirty="0"/>
-              <a:t>Module 2 Learning Objectives (Cont’d)</a:t>
+              <a:t>Module 2 Learning Objectives</a:t>
             </a:r>
           </a:p>
         </p:txBody>
@@ -2322,30 +2287,27 @@
           <a:p>
             <a:r>
               <a:rPr lang="en-US" dirty="0"/>
-              <a:t>Integrate an on-premises network with an Azure virtual network</a:t>
-            </a:r>
-          </a:p>
-          <a:p>
-            <a:r>
-              <a:rPr lang="en-US" dirty="0"/>
-              <a:t>Manage role-based access control (RBAC)</a:t>
-            </a:r>
-          </a:p>
-          <a:p>
-            <a:r>
-              <a:rPr lang="en-US" dirty="0"/>
-              <a:t>Implement Multi-Factor Authentication (MFA)</a:t>
-            </a:r>
-          </a:p>
-          <a:p>
-            <a:endParaRPr lang="en-US" dirty="0"/>
+              <a:t>Migrate servers to Azure</a:t>
+            </a:r>
+          </a:p>
+          <a:p>
+            <a:r>
+              <a:rPr lang="en-US" dirty="0"/>
+              <a:t>Configure serverless computing</a:t>
+            </a:r>
+          </a:p>
+          <a:p>
+            <a:r>
+              <a:rPr lang="en-US" dirty="0"/>
+              <a:t>Implement application load balancing</a:t>
+            </a:r>
           </a:p>
         </p:txBody>
       </p:sp>
     </p:spTree>
     <p:extLst>
       <p:ext uri="{BB962C8B-B14F-4D97-AF65-F5344CB8AC3E}">
-        <p14:creationId xmlns:p14="http://schemas.microsoft.com/office/powerpoint/2010/main" val="1823920827"/>
+        <p14:creationId xmlns:p14="http://schemas.microsoft.com/office/powerpoint/2010/main" val="2206647766"/>
       </p:ext>
     </p:extLst>
   </p:cSld>
@@ -2374,10 +2336,10 @@
       </p:grpSpPr>
       <p:sp>
         <p:nvSpPr>
-          <p:cNvPr id="6" name="Title 5">
+          <p:cNvPr id="2" name="Title 1">
             <a:extLst>
               <a:ext uri="{FF2B5EF4-FFF2-40B4-BE49-F238E27FC236}">
-                <a16:creationId xmlns:a16="http://schemas.microsoft.com/office/drawing/2014/main" id="{D9FFC0E8-97CE-4426-A0C0-75252002ED16}"/>
+                <a16:creationId xmlns:a16="http://schemas.microsoft.com/office/drawing/2014/main" id="{25C6E663-D0AD-564E-AFD0-A2EAFE729E79}"/>
               </a:ext>
             </a:extLst>
           </p:cNvPr>
@@ -2385,7 +2347,7 @@
             <a:spLocks noGrp="1"/>
           </p:cNvSpPr>
           <p:nvPr>
-            <p:ph type="ctrTitle"/>
+            <p:ph type="title"/>
           </p:nvPr>
         </p:nvSpPr>
         <p:spPr/>
@@ -2395,11 +2357,50 @@
           <a:p>
             <a:r>
               <a:rPr lang="en-US" dirty="0"/>
-              <a:t>Module 3: Create and Deploy Apps in Azure</a:t>
-            </a:r>
-            <a:br>
-              <a:rPr lang="en-US" dirty="0"/>
-            </a:br>
+              <a:t>Module 2 Learning Objectives (Cont’d)</a:t>
+            </a:r>
+          </a:p>
+        </p:txBody>
+      </p:sp>
+      <p:sp>
+        <p:nvSpPr>
+          <p:cNvPr id="3" name="Content Placeholder 2">
+            <a:extLst>
+              <a:ext uri="{FF2B5EF4-FFF2-40B4-BE49-F238E27FC236}">
+                <a16:creationId xmlns:a16="http://schemas.microsoft.com/office/drawing/2014/main" id="{CC25EB59-169C-FE49-B976-0294784B9F8E}"/>
+              </a:ext>
+            </a:extLst>
+          </p:cNvPr>
+          <p:cNvSpPr>
+            <a:spLocks noGrp="1"/>
+          </p:cNvSpPr>
+          <p:nvPr>
+            <p:ph idx="1"/>
+          </p:nvPr>
+        </p:nvSpPr>
+        <p:spPr/>
+        <p:txBody>
+          <a:bodyPr/>
+          <a:lstStyle/>
+          <a:p>
+            <a:r>
+              <a:rPr lang="en-US" dirty="0"/>
+              <a:t>Integrate an on-premises network with an Azure virtual network</a:t>
+            </a:r>
+          </a:p>
+          <a:p>
+            <a:r>
+              <a:rPr lang="en-US" dirty="0"/>
+              <a:t>Manage role-based access control (RBAC)</a:t>
+            </a:r>
+          </a:p>
+          <a:p>
+            <a:r>
+              <a:rPr lang="en-US" dirty="0"/>
+              <a:t>Implement Multi-Factor Authentication (MFA)</a:t>
+            </a:r>
+          </a:p>
+          <a:p>
             <a:endParaRPr lang="en-US" dirty="0"/>
           </a:p>
         </p:txBody>
@@ -2407,7 +2408,7 @@
     </p:spTree>
     <p:extLst>
       <p:ext uri="{BB962C8B-B14F-4D97-AF65-F5344CB8AC3E}">
-        <p14:creationId xmlns:p14="http://schemas.microsoft.com/office/powerpoint/2010/main" val="3667771247"/>
+        <p14:creationId xmlns:p14="http://schemas.microsoft.com/office/powerpoint/2010/main" val="1823920827"/>
       </p:ext>
     </p:extLst>
   </p:cSld>
@@ -2436,10 +2437,10 @@
       </p:grpSpPr>
       <p:sp>
         <p:nvSpPr>
-          <p:cNvPr id="2" name="Title 1">
+          <p:cNvPr id="6" name="Title 5">
             <a:extLst>
               <a:ext uri="{FF2B5EF4-FFF2-40B4-BE49-F238E27FC236}">
-                <a16:creationId xmlns:a16="http://schemas.microsoft.com/office/drawing/2014/main" id="{25C6E663-D0AD-564E-AFD0-A2EAFE729E79}"/>
+                <a16:creationId xmlns:a16="http://schemas.microsoft.com/office/drawing/2014/main" id="{D9FFC0E8-97CE-4426-A0C0-75252002ED16}"/>
               </a:ext>
             </a:extLst>
           </p:cNvPr>
@@ -2447,7 +2448,7 @@
             <a:spLocks noGrp="1"/>
           </p:cNvSpPr>
           <p:nvPr>
-            <p:ph type="title"/>
+            <p:ph type="ctrTitle"/>
           </p:nvPr>
         </p:nvSpPr>
         <p:spPr/>
@@ -2457,44 +2458,11 @@
           <a:p>
             <a:r>
               <a:rPr lang="en-US" dirty="0"/>
-              <a:t>Module 3 Learning Objectives</a:t>
-            </a:r>
-          </a:p>
-        </p:txBody>
-      </p:sp>
-      <p:sp>
-        <p:nvSpPr>
-          <p:cNvPr id="3" name="Content Placeholder 2">
-            <a:extLst>
-              <a:ext uri="{FF2B5EF4-FFF2-40B4-BE49-F238E27FC236}">
-                <a16:creationId xmlns:a16="http://schemas.microsoft.com/office/drawing/2014/main" id="{CC25EB59-169C-FE49-B976-0294784B9F8E}"/>
-              </a:ext>
-            </a:extLst>
-          </p:cNvPr>
-          <p:cNvSpPr>
-            <a:spLocks noGrp="1"/>
-          </p:cNvSpPr>
-          <p:nvPr>
-            <p:ph idx="1"/>
-          </p:nvPr>
-        </p:nvSpPr>
-        <p:spPr/>
-        <p:txBody>
-          <a:bodyPr/>
-          <a:lstStyle/>
-          <a:p>
-            <a:r>
-              <a:rPr lang="en-US" dirty="0"/>
-              <a:t>Create web apps by using PaaS</a:t>
-            </a:r>
-          </a:p>
-          <a:p>
-            <a:r>
-              <a:rPr lang="en-US" dirty="0"/>
-              <a:t>Design and develop apps that run in containers</a:t>
-            </a:r>
-          </a:p>
-          <a:p>
+              <a:t>Module 3: Create and Deploy Apps in Azure</a:t>
+            </a:r>
+            <a:br>
+              <a:rPr lang="en-US" dirty="0"/>
+            </a:br>
             <a:endParaRPr lang="en-US" dirty="0"/>
           </a:p>
         </p:txBody>
@@ -2502,7 +2470,7 @@
     </p:spTree>
     <p:extLst>
       <p:ext uri="{BB962C8B-B14F-4D97-AF65-F5344CB8AC3E}">
-        <p14:creationId xmlns:p14="http://schemas.microsoft.com/office/powerpoint/2010/main" val="2781957895"/>
+        <p14:creationId xmlns:p14="http://schemas.microsoft.com/office/powerpoint/2010/main" val="3667771247"/>
       </p:ext>
     </p:extLst>
   </p:cSld>
@@ -2531,10 +2499,10 @@
       </p:grpSpPr>
       <p:sp>
         <p:nvSpPr>
-          <p:cNvPr id="6" name="Title 5">
+          <p:cNvPr id="2" name="Title 1">
             <a:extLst>
               <a:ext uri="{FF2B5EF4-FFF2-40B4-BE49-F238E27FC236}">
-                <a16:creationId xmlns:a16="http://schemas.microsoft.com/office/drawing/2014/main" id="{D9FFC0E8-97CE-4426-A0C0-75252002ED16}"/>
+                <a16:creationId xmlns:a16="http://schemas.microsoft.com/office/drawing/2014/main" id="{25C6E663-D0AD-564E-AFD0-A2EAFE729E79}"/>
               </a:ext>
             </a:extLst>
           </p:cNvPr>
@@ -2542,7 +2510,7 @@
             <a:spLocks noGrp="1"/>
           </p:cNvSpPr>
           <p:nvPr>
-            <p:ph type="ctrTitle"/>
+            <p:ph type="title"/>
           </p:nvPr>
         </p:nvSpPr>
         <p:spPr/>
@@ -2552,11 +2520,44 @@
           <a:p>
             <a:r>
               <a:rPr lang="en-US" dirty="0"/>
-              <a:t>Module 4: Implement Authentication and Secure Data in Azure</a:t>
-            </a:r>
-            <a:br>
-              <a:rPr lang="en-US" dirty="0"/>
-            </a:br>
+              <a:t>Module 3 Learning Objectives</a:t>
+            </a:r>
+          </a:p>
+        </p:txBody>
+      </p:sp>
+      <p:sp>
+        <p:nvSpPr>
+          <p:cNvPr id="3" name="Content Placeholder 2">
+            <a:extLst>
+              <a:ext uri="{FF2B5EF4-FFF2-40B4-BE49-F238E27FC236}">
+                <a16:creationId xmlns:a16="http://schemas.microsoft.com/office/drawing/2014/main" id="{CC25EB59-169C-FE49-B976-0294784B9F8E}"/>
+              </a:ext>
+            </a:extLst>
+          </p:cNvPr>
+          <p:cNvSpPr>
+            <a:spLocks noGrp="1"/>
+          </p:cNvSpPr>
+          <p:nvPr>
+            <p:ph idx="1"/>
+          </p:nvPr>
+        </p:nvSpPr>
+        <p:spPr/>
+        <p:txBody>
+          <a:bodyPr/>
+          <a:lstStyle/>
+          <a:p>
+            <a:r>
+              <a:rPr lang="en-US" dirty="0"/>
+              <a:t>Create web apps by using PaaS</a:t>
+            </a:r>
+          </a:p>
+          <a:p>
+            <a:r>
+              <a:rPr lang="en-US" dirty="0"/>
+              <a:t>Design and develop apps that run in containers</a:t>
+            </a:r>
+          </a:p>
+          <a:p>
             <a:endParaRPr lang="en-US" dirty="0"/>
           </a:p>
         </p:txBody>
@@ -2564,7 +2565,7 @@
     </p:spTree>
     <p:extLst>
       <p:ext uri="{BB962C8B-B14F-4D97-AF65-F5344CB8AC3E}">
-        <p14:creationId xmlns:p14="http://schemas.microsoft.com/office/powerpoint/2010/main" val="2587392459"/>
+        <p14:creationId xmlns:p14="http://schemas.microsoft.com/office/powerpoint/2010/main" val="2781957895"/>
       </p:ext>
     </p:extLst>
   </p:cSld>
@@ -2593,10 +2594,10 @@
       </p:grpSpPr>
       <p:sp>
         <p:nvSpPr>
-          <p:cNvPr id="2" name="Title 1">
+          <p:cNvPr id="6" name="Title 5">
             <a:extLst>
               <a:ext uri="{FF2B5EF4-FFF2-40B4-BE49-F238E27FC236}">
-                <a16:creationId xmlns:a16="http://schemas.microsoft.com/office/drawing/2014/main" id="{25C6E663-D0AD-564E-AFD0-A2EAFE729E79}"/>
+                <a16:creationId xmlns:a16="http://schemas.microsoft.com/office/drawing/2014/main" id="{D9FFC0E8-97CE-4426-A0C0-75252002ED16}"/>
               </a:ext>
             </a:extLst>
           </p:cNvPr>
@@ -2604,7 +2605,7 @@
             <a:spLocks noGrp="1"/>
           </p:cNvSpPr>
           <p:nvPr>
-            <p:ph type="title"/>
+            <p:ph type="ctrTitle"/>
           </p:nvPr>
         </p:nvSpPr>
         <p:spPr/>
@@ -2614,44 +2615,11 @@
           <a:p>
             <a:r>
               <a:rPr lang="en-US" dirty="0"/>
-              <a:t>Module 4 Learning Objectives</a:t>
-            </a:r>
-          </a:p>
-        </p:txBody>
-      </p:sp>
-      <p:sp>
-        <p:nvSpPr>
-          <p:cNvPr id="3" name="Content Placeholder 2">
-            <a:extLst>
-              <a:ext uri="{FF2B5EF4-FFF2-40B4-BE49-F238E27FC236}">
-                <a16:creationId xmlns:a16="http://schemas.microsoft.com/office/drawing/2014/main" id="{CC25EB59-169C-FE49-B976-0294784B9F8E}"/>
-              </a:ext>
-            </a:extLst>
-          </p:cNvPr>
-          <p:cNvSpPr>
-            <a:spLocks noGrp="1"/>
-          </p:cNvSpPr>
-          <p:nvPr>
-            <p:ph idx="1"/>
-          </p:nvPr>
-        </p:nvSpPr>
-        <p:spPr/>
-        <p:txBody>
-          <a:bodyPr/>
-          <a:lstStyle/>
-          <a:p>
-            <a:r>
-              <a:rPr lang="en-US" dirty="0"/>
-              <a:t>Implement authentication</a:t>
-            </a:r>
-          </a:p>
-          <a:p>
-            <a:r>
-              <a:rPr lang="en-US" dirty="0"/>
-              <a:t>Implement secure data solutions</a:t>
-            </a:r>
-          </a:p>
-          <a:p>
+              <a:t>Module 4: Implement Authentication and Secure Data in Azure</a:t>
+            </a:r>
+            <a:br>
+              <a:rPr lang="en-US" dirty="0"/>
+            </a:br>
             <a:endParaRPr lang="en-US" dirty="0"/>
           </a:p>
         </p:txBody>
@@ -2659,7 +2627,7 @@
     </p:spTree>
     <p:extLst>
       <p:ext uri="{BB962C8B-B14F-4D97-AF65-F5344CB8AC3E}">
-        <p14:creationId xmlns:p14="http://schemas.microsoft.com/office/powerpoint/2010/main" val="1817052382"/>
+        <p14:creationId xmlns:p14="http://schemas.microsoft.com/office/powerpoint/2010/main" val="2587392459"/>
       </p:ext>
     </p:extLst>
   </p:cSld>
@@ -2688,10 +2656,10 @@
       </p:grpSpPr>
       <p:sp>
         <p:nvSpPr>
-          <p:cNvPr id="6" name="Title 5">
+          <p:cNvPr id="2" name="Title 1">
             <a:extLst>
               <a:ext uri="{FF2B5EF4-FFF2-40B4-BE49-F238E27FC236}">
-                <a16:creationId xmlns:a16="http://schemas.microsoft.com/office/drawing/2014/main" id="{D9FFC0E8-97CE-4426-A0C0-75252002ED16}"/>
+                <a16:creationId xmlns:a16="http://schemas.microsoft.com/office/drawing/2014/main" id="{25C6E663-D0AD-564E-AFD0-A2EAFE729E79}"/>
               </a:ext>
             </a:extLst>
           </p:cNvPr>
@@ -2699,7 +2667,7 @@
             <a:spLocks noGrp="1"/>
           </p:cNvSpPr>
           <p:nvPr>
-            <p:ph type="ctrTitle"/>
+            <p:ph type="title"/>
           </p:nvPr>
         </p:nvSpPr>
         <p:spPr/>
@@ -2709,11 +2677,44 @@
           <a:p>
             <a:r>
               <a:rPr lang="en-US" dirty="0"/>
-              <a:t>Module 5: Develop for the Cloud and for Azure Storage</a:t>
-            </a:r>
-            <a:br>
-              <a:rPr lang="en-US" dirty="0"/>
-            </a:br>
+              <a:t>Module 4 Learning Objectives</a:t>
+            </a:r>
+          </a:p>
+        </p:txBody>
+      </p:sp>
+      <p:sp>
+        <p:nvSpPr>
+          <p:cNvPr id="3" name="Content Placeholder 2">
+            <a:extLst>
+              <a:ext uri="{FF2B5EF4-FFF2-40B4-BE49-F238E27FC236}">
+                <a16:creationId xmlns:a16="http://schemas.microsoft.com/office/drawing/2014/main" id="{CC25EB59-169C-FE49-B976-0294784B9F8E}"/>
+              </a:ext>
+            </a:extLst>
+          </p:cNvPr>
+          <p:cNvSpPr>
+            <a:spLocks noGrp="1"/>
+          </p:cNvSpPr>
+          <p:nvPr>
+            <p:ph idx="1"/>
+          </p:nvPr>
+        </p:nvSpPr>
+        <p:spPr/>
+        <p:txBody>
+          <a:bodyPr/>
+          <a:lstStyle/>
+          <a:p>
+            <a:r>
+              <a:rPr lang="en-US" dirty="0"/>
+              <a:t>Implement authentication</a:t>
+            </a:r>
+          </a:p>
+          <a:p>
+            <a:r>
+              <a:rPr lang="en-US" dirty="0"/>
+              <a:t>Implement secure data solutions</a:t>
+            </a:r>
+          </a:p>
+          <a:p>
             <a:endParaRPr lang="en-US" dirty="0"/>
           </a:p>
         </p:txBody>
@@ -2721,7 +2722,7 @@
     </p:spTree>
     <p:extLst>
       <p:ext uri="{BB962C8B-B14F-4D97-AF65-F5344CB8AC3E}">
-        <p14:creationId xmlns:p14="http://schemas.microsoft.com/office/powerpoint/2010/main" val="53707430"/>
+        <p14:creationId xmlns:p14="http://schemas.microsoft.com/office/powerpoint/2010/main" val="1817052382"/>
       </p:ext>
     </p:extLst>
   </p:cSld>
@@ -2750,10 +2751,10 @@
       </p:grpSpPr>
       <p:sp>
         <p:nvSpPr>
-          <p:cNvPr id="2" name="Title 1">
+          <p:cNvPr id="6" name="Title 5">
             <a:extLst>
               <a:ext uri="{FF2B5EF4-FFF2-40B4-BE49-F238E27FC236}">
-                <a16:creationId xmlns:a16="http://schemas.microsoft.com/office/drawing/2014/main" id="{25C6E663-D0AD-564E-AFD0-A2EAFE729E79}"/>
+                <a16:creationId xmlns:a16="http://schemas.microsoft.com/office/drawing/2014/main" id="{D9FFC0E8-97CE-4426-A0C0-75252002ED16}"/>
               </a:ext>
             </a:extLst>
           </p:cNvPr>
@@ -2761,7 +2762,7 @@
             <a:spLocks noGrp="1"/>
           </p:cNvSpPr>
           <p:nvPr>
-            <p:ph type="title"/>
+            <p:ph type="ctrTitle"/>
           </p:nvPr>
         </p:nvSpPr>
         <p:spPr/>
@@ -2771,56 +2772,11 @@
           <a:p>
             <a:r>
               <a:rPr lang="en-US" dirty="0"/>
-              <a:t>Module 5 Learning Objectives</a:t>
-            </a:r>
-          </a:p>
-        </p:txBody>
-      </p:sp>
-      <p:sp>
-        <p:nvSpPr>
-          <p:cNvPr id="3" name="Content Placeholder 2">
-            <a:extLst>
-              <a:ext uri="{FF2B5EF4-FFF2-40B4-BE49-F238E27FC236}">
-                <a16:creationId xmlns:a16="http://schemas.microsoft.com/office/drawing/2014/main" id="{CC25EB59-169C-FE49-B976-0294784B9F8E}"/>
-              </a:ext>
-            </a:extLst>
-          </p:cNvPr>
-          <p:cNvSpPr>
-            <a:spLocks noGrp="1"/>
-          </p:cNvSpPr>
-          <p:nvPr>
-            <p:ph idx="1"/>
-          </p:nvPr>
-        </p:nvSpPr>
-        <p:spPr/>
-        <p:txBody>
-          <a:bodyPr/>
-          <a:lstStyle/>
-          <a:p>
-            <a:r>
-              <a:rPr lang="en-US" dirty="0"/>
-              <a:t>Develop solutions that use Cosmos DB storage</a:t>
-            </a:r>
-          </a:p>
-          <a:p>
-            <a:r>
-              <a:rPr lang="en-US" dirty="0"/>
-              <a:t>Develop solutions that use a relational database</a:t>
-            </a:r>
-          </a:p>
-          <a:p>
-            <a:r>
-              <a:rPr lang="en-US" dirty="0"/>
-              <a:t>Configure a message-based integration architecture</a:t>
-            </a:r>
-          </a:p>
-          <a:p>
-            <a:r>
-              <a:rPr lang="en-US" dirty="0"/>
-              <a:t>Develop for autoscaling</a:t>
-            </a:r>
-          </a:p>
-          <a:p>
+              <a:t>Module 5: Develop for the Cloud and for Azure Storage</a:t>
+            </a:r>
+            <a:br>
+              <a:rPr lang="en-US" dirty="0"/>
+            </a:br>
             <a:endParaRPr lang="en-US" dirty="0"/>
           </a:p>
         </p:txBody>
@@ -2828,7 +2784,7 @@
     </p:spTree>
     <p:extLst>
       <p:ext uri="{BB962C8B-B14F-4D97-AF65-F5344CB8AC3E}">
-        <p14:creationId xmlns:p14="http://schemas.microsoft.com/office/powerpoint/2010/main" val="4289163441"/>
+        <p14:creationId xmlns:p14="http://schemas.microsoft.com/office/powerpoint/2010/main" val="53707430"/>
       </p:ext>
     </p:extLst>
   </p:cSld>
@@ -2857,10 +2813,10 @@
       </p:grpSpPr>
       <p:sp>
         <p:nvSpPr>
-          <p:cNvPr id="6" name="Title 5">
+          <p:cNvPr id="2" name="Title 1">
             <a:extLst>
               <a:ext uri="{FF2B5EF4-FFF2-40B4-BE49-F238E27FC236}">
-                <a16:creationId xmlns:a16="http://schemas.microsoft.com/office/drawing/2014/main" id="{D9FFC0E8-97CE-4426-A0C0-75252002ED16}"/>
+                <a16:creationId xmlns:a16="http://schemas.microsoft.com/office/drawing/2014/main" id="{25C6E663-D0AD-564E-AFD0-A2EAFE729E79}"/>
               </a:ext>
             </a:extLst>
           </p:cNvPr>
@@ -2868,7 +2824,7 @@
             <a:spLocks noGrp="1"/>
           </p:cNvSpPr>
           <p:nvPr>
-            <p:ph type="ctrTitle"/>
+            <p:ph type="title"/>
           </p:nvPr>
         </p:nvSpPr>
         <p:spPr/>
@@ -2878,11 +2834,56 @@
           <a:p>
             <a:r>
               <a:rPr lang="en-US" dirty="0"/>
-              <a:t>Module 6: Exam AZ-300 Exam Strategy</a:t>
-            </a:r>
-            <a:br>
-              <a:rPr lang="en-US" dirty="0"/>
-            </a:br>
+              <a:t>Module 5 Learning Objectives</a:t>
+            </a:r>
+          </a:p>
+        </p:txBody>
+      </p:sp>
+      <p:sp>
+        <p:nvSpPr>
+          <p:cNvPr id="3" name="Content Placeholder 2">
+            <a:extLst>
+              <a:ext uri="{FF2B5EF4-FFF2-40B4-BE49-F238E27FC236}">
+                <a16:creationId xmlns:a16="http://schemas.microsoft.com/office/drawing/2014/main" id="{CC25EB59-169C-FE49-B976-0294784B9F8E}"/>
+              </a:ext>
+            </a:extLst>
+          </p:cNvPr>
+          <p:cNvSpPr>
+            <a:spLocks noGrp="1"/>
+          </p:cNvSpPr>
+          <p:nvPr>
+            <p:ph idx="1"/>
+          </p:nvPr>
+        </p:nvSpPr>
+        <p:spPr/>
+        <p:txBody>
+          <a:bodyPr/>
+          <a:lstStyle/>
+          <a:p>
+            <a:r>
+              <a:rPr lang="en-US" dirty="0"/>
+              <a:t>Develop solutions that use Cosmos DB storage</a:t>
+            </a:r>
+          </a:p>
+          <a:p>
+            <a:r>
+              <a:rPr lang="en-US" dirty="0"/>
+              <a:t>Develop solutions that use a relational database</a:t>
+            </a:r>
+          </a:p>
+          <a:p>
+            <a:r>
+              <a:rPr lang="en-US" dirty="0"/>
+              <a:t>Configure a message-based integration architecture</a:t>
+            </a:r>
+          </a:p>
+          <a:p>
+            <a:r>
+              <a:rPr lang="en-US" dirty="0"/>
+              <a:t>Develop for autoscaling</a:t>
+            </a:r>
+          </a:p>
+          <a:p>
             <a:endParaRPr lang="en-US" dirty="0"/>
           </a:p>
         </p:txBody>
@@ -2890,7 +2891,7 @@
     </p:spTree>
     <p:extLst>
       <p:ext uri="{BB962C8B-B14F-4D97-AF65-F5344CB8AC3E}">
-        <p14:creationId xmlns:p14="http://schemas.microsoft.com/office/powerpoint/2010/main" val="3574558851"/>
+        <p14:creationId xmlns:p14="http://schemas.microsoft.com/office/powerpoint/2010/main" val="4289163441"/>
       </p:ext>
     </p:extLst>
   </p:cSld>
@@ -2919,10 +2920,10 @@
       </p:grpSpPr>
       <p:sp>
         <p:nvSpPr>
-          <p:cNvPr id="2" name="Title 1">
+          <p:cNvPr id="6" name="Title 5">
             <a:extLst>
               <a:ext uri="{FF2B5EF4-FFF2-40B4-BE49-F238E27FC236}">
-                <a16:creationId xmlns:a16="http://schemas.microsoft.com/office/drawing/2014/main" id="{25C6E663-D0AD-564E-AFD0-A2EAFE729E79}"/>
+                <a16:creationId xmlns:a16="http://schemas.microsoft.com/office/drawing/2014/main" id="{D9FFC0E8-97CE-4426-A0C0-75252002ED16}"/>
               </a:ext>
             </a:extLst>
           </p:cNvPr>
@@ -2930,7 +2931,7 @@
             <a:spLocks noGrp="1"/>
           </p:cNvSpPr>
           <p:nvPr>
-            <p:ph type="title"/>
+            <p:ph type="ctrTitle"/>
           </p:nvPr>
         </p:nvSpPr>
         <p:spPr/>
@@ -2940,56 +2941,11 @@
           <a:p>
             <a:r>
               <a:rPr lang="en-US" dirty="0"/>
-              <a:t>Module 6 Learning Objectives</a:t>
-            </a:r>
-          </a:p>
-        </p:txBody>
-      </p:sp>
-      <p:sp>
-        <p:nvSpPr>
-          <p:cNvPr id="3" name="Content Placeholder 2">
-            <a:extLst>
-              <a:ext uri="{FF2B5EF4-FFF2-40B4-BE49-F238E27FC236}">
-                <a16:creationId xmlns:a16="http://schemas.microsoft.com/office/drawing/2014/main" id="{CC25EB59-169C-FE49-B976-0294784B9F8E}"/>
-              </a:ext>
-            </a:extLst>
-          </p:cNvPr>
-          <p:cNvSpPr>
-            <a:spLocks noGrp="1"/>
-          </p:cNvSpPr>
-          <p:nvPr>
-            <p:ph idx="1"/>
-          </p:nvPr>
-        </p:nvSpPr>
-        <p:spPr/>
-        <p:txBody>
-          <a:bodyPr/>
-          <a:lstStyle/>
-          <a:p>
-            <a:r>
-              <a:rPr lang="en-US" dirty="0"/>
-              <a:t>Grasp the content</a:t>
-            </a:r>
-          </a:p>
-          <a:p>
-            <a:r>
-              <a:rPr lang="en-US" dirty="0"/>
-              <a:t>Acquire the hands-on skills</a:t>
-            </a:r>
-          </a:p>
-          <a:p>
-            <a:r>
-              <a:rPr lang="en-US" dirty="0"/>
-              <a:t>Master computer-based testing</a:t>
-            </a:r>
-          </a:p>
-          <a:p>
-            <a:r>
-              <a:rPr lang="en-US" dirty="0"/>
-              <a:t>Comprehend what to expect before, during, and after the exam</a:t>
-            </a:r>
-          </a:p>
-          <a:p>
+              <a:t>Module 6: Exam AZ-300 Exam Strategy</a:t>
+            </a:r>
+            <a:br>
+              <a:rPr lang="en-US" dirty="0"/>
+            </a:br>
             <a:endParaRPr lang="en-US" dirty="0"/>
           </a:p>
         </p:txBody>
@@ -2997,7 +2953,7 @@
     </p:spTree>
     <p:extLst>
       <p:ext uri="{BB962C8B-B14F-4D97-AF65-F5344CB8AC3E}">
-        <p14:creationId xmlns:p14="http://schemas.microsoft.com/office/powerpoint/2010/main" val="906026932"/>
+        <p14:creationId xmlns:p14="http://schemas.microsoft.com/office/powerpoint/2010/main" val="3574558851"/>
       </p:ext>
     </p:extLst>
   </p:cSld>
@@ -3167,6 +3123,113 @@
           <p:cNvPr id="2" name="Title 1">
             <a:extLst>
               <a:ext uri="{FF2B5EF4-FFF2-40B4-BE49-F238E27FC236}">
+                <a16:creationId xmlns:a16="http://schemas.microsoft.com/office/drawing/2014/main" id="{25C6E663-D0AD-564E-AFD0-A2EAFE729E79}"/>
+              </a:ext>
+            </a:extLst>
+          </p:cNvPr>
+          <p:cNvSpPr>
+            <a:spLocks noGrp="1"/>
+          </p:cNvSpPr>
+          <p:nvPr>
+            <p:ph type="title"/>
+          </p:nvPr>
+        </p:nvSpPr>
+        <p:spPr/>
+        <p:txBody>
+          <a:bodyPr/>
+          <a:lstStyle/>
+          <a:p>
+            <a:r>
+              <a:rPr lang="en-US" dirty="0"/>
+              <a:t>Module 6 Learning Objectives</a:t>
+            </a:r>
+          </a:p>
+        </p:txBody>
+      </p:sp>
+      <p:sp>
+        <p:nvSpPr>
+          <p:cNvPr id="3" name="Content Placeholder 2">
+            <a:extLst>
+              <a:ext uri="{FF2B5EF4-FFF2-40B4-BE49-F238E27FC236}">
+                <a16:creationId xmlns:a16="http://schemas.microsoft.com/office/drawing/2014/main" id="{CC25EB59-169C-FE49-B976-0294784B9F8E}"/>
+              </a:ext>
+            </a:extLst>
+          </p:cNvPr>
+          <p:cNvSpPr>
+            <a:spLocks noGrp="1"/>
+          </p:cNvSpPr>
+          <p:nvPr>
+            <p:ph idx="1"/>
+          </p:nvPr>
+        </p:nvSpPr>
+        <p:spPr/>
+        <p:txBody>
+          <a:bodyPr/>
+          <a:lstStyle/>
+          <a:p>
+            <a:r>
+              <a:rPr lang="en-US" dirty="0"/>
+              <a:t>Grasp the content</a:t>
+            </a:r>
+          </a:p>
+          <a:p>
+            <a:r>
+              <a:rPr lang="en-US" dirty="0"/>
+              <a:t>Acquire the hands-on skills</a:t>
+            </a:r>
+          </a:p>
+          <a:p>
+            <a:r>
+              <a:rPr lang="en-US" dirty="0"/>
+              <a:t>Master computer-based testing</a:t>
+            </a:r>
+          </a:p>
+          <a:p>
+            <a:r>
+              <a:rPr lang="en-US" dirty="0"/>
+              <a:t>Comprehend what to expect before, during, and after the exam</a:t>
+            </a:r>
+          </a:p>
+          <a:p>
+            <a:endParaRPr lang="en-US" dirty="0"/>
+          </a:p>
+        </p:txBody>
+      </p:sp>
+    </p:spTree>
+    <p:extLst>
+      <p:ext uri="{BB962C8B-B14F-4D97-AF65-F5344CB8AC3E}">
+        <p14:creationId xmlns:p14="http://schemas.microsoft.com/office/powerpoint/2010/main" val="906026932"/>
+      </p:ext>
+    </p:extLst>
+  </p:cSld>
+  <p:clrMapOvr>
+    <a:masterClrMapping/>
+  </p:clrMapOvr>
+</p:sld>
+</file>
+
+<file path=ppt/slides/slide21.xml><?xml version="1.0" encoding="utf-8"?>
+<p:sld xmlns:a="http://schemas.openxmlformats.org/drawingml/2006/main" xmlns:r="http://schemas.openxmlformats.org/officeDocument/2006/relationships" xmlns:p="http://schemas.openxmlformats.org/presentationml/2006/main">
+  <p:cSld>
+    <p:spTree>
+      <p:nvGrpSpPr>
+        <p:cNvPr id="1" name=""/>
+        <p:cNvGrpSpPr/>
+        <p:nvPr/>
+      </p:nvGrpSpPr>
+      <p:grpSpPr>
+        <a:xfrm>
+          <a:off x="0" y="0"/>
+          <a:ext cx="0" cy="0"/>
+          <a:chOff x="0" y="0"/>
+          <a:chExt cx="0" cy="0"/>
+        </a:xfrm>
+      </p:grpSpPr>
+      <p:sp>
+        <p:nvSpPr>
+          <p:cNvPr id="2" name="Title 1">
+            <a:extLst>
+              <a:ext uri="{FF2B5EF4-FFF2-40B4-BE49-F238E27FC236}">
                 <a16:creationId xmlns:a16="http://schemas.microsoft.com/office/drawing/2014/main" id="{9499EFF8-D9AC-F84D-8949-EF6A66C51733}"/>
               </a:ext>
             </a:extLst>
@@ -3917,10 +3980,10 @@
       </p:grpSpPr>
       <p:sp>
         <p:nvSpPr>
-          <p:cNvPr id="6" name="Title 5">
+          <p:cNvPr id="2" name="Title 1">
             <a:extLst>
               <a:ext uri="{FF2B5EF4-FFF2-40B4-BE49-F238E27FC236}">
-                <a16:creationId xmlns:a16="http://schemas.microsoft.com/office/drawing/2014/main" id="{D9FFC0E8-97CE-4426-A0C0-75252002ED16}"/>
+                <a16:creationId xmlns:a16="http://schemas.microsoft.com/office/drawing/2014/main" id="{EC1F8C14-6600-418F-8837-769A61665ECC}"/>
               </a:ext>
             </a:extLst>
           </p:cNvPr>
@@ -3928,7 +3991,7 @@
             <a:spLocks noGrp="1"/>
           </p:cNvSpPr>
           <p:nvPr>
-            <p:ph type="ctrTitle"/>
+            <p:ph type="title"/>
           </p:nvPr>
         </p:nvSpPr>
         <p:spPr/>
@@ -3938,19 +4001,15 @@
           <a:p>
             <a:r>
               <a:rPr lang="en-US" dirty="0"/>
-              <a:t>Module 2 Implement Azure Workloads and Security</a:t>
-            </a:r>
-            <a:br>
-              <a:rPr lang="en-US" dirty="0"/>
-            </a:br>
-            <a:endParaRPr lang="en-US" dirty="0"/>
+              <a:t>Our Environment</a:t>
+            </a:r>
           </a:p>
         </p:txBody>
       </p:sp>
     </p:spTree>
     <p:extLst>
       <p:ext uri="{BB962C8B-B14F-4D97-AF65-F5344CB8AC3E}">
-        <p14:creationId xmlns:p14="http://schemas.microsoft.com/office/powerpoint/2010/main" val="3068621773"/>
+        <p14:creationId xmlns:p14="http://schemas.microsoft.com/office/powerpoint/2010/main" val="4228796399"/>
       </p:ext>
     </p:extLst>
   </p:cSld>

</xml_diff>